<commit_message>
corredcted errors in deliverable 2 and updated powerpoint
</commit_message>
<xml_diff>
--- a/deliverables/Encore Tickets Presentation.pptx
+++ b/deliverables/Encore Tickets Presentation.pptx
@@ -7,12 +7,12 @@
   <p:sldIdLst>
     <p:sldId id="256" r:id="rId2"/>
     <p:sldId id="258" r:id="rId3"/>
-    <p:sldId id="269" r:id="rId4"/>
-    <p:sldId id="270" r:id="rId5"/>
-    <p:sldId id="271" r:id="rId6"/>
-    <p:sldId id="268" r:id="rId7"/>
-    <p:sldId id="267" r:id="rId8"/>
-    <p:sldId id="266" r:id="rId9"/>
+    <p:sldId id="268" r:id="rId4"/>
+    <p:sldId id="267" r:id="rId5"/>
+    <p:sldId id="266" r:id="rId6"/>
+    <p:sldId id="269" r:id="rId7"/>
+    <p:sldId id="273" r:id="rId8"/>
+    <p:sldId id="271" r:id="rId9"/>
     <p:sldId id="263" r:id="rId10"/>
     <p:sldId id="272" r:id="rId11"/>
   </p:sldIdLst>
@@ -349,7 +349,7 @@
           <a:p>
             <a:fld id="{7A76B3C4-3CD0-459F-98BB-74D5FE78E4FF}" type="datetimeFigureOut">
               <a:rPr lang="en-US" smtClean="0"/>
-              <a:t>4/22/19</a:t>
+              <a:t>4/22/2019</a:t>
             </a:fld>
             <a:endParaRPr lang="en-US"/>
           </a:p>
@@ -557,7 +557,7 @@
           <a:p>
             <a:fld id="{7A76B3C4-3CD0-459F-98BB-74D5FE78E4FF}" type="datetimeFigureOut">
               <a:rPr lang="en-US" smtClean="0"/>
-              <a:t>4/22/19</a:t>
+              <a:t>4/22/2019</a:t>
             </a:fld>
             <a:endParaRPr lang="en-US"/>
           </a:p>
@@ -815,7 +815,7 @@
           <a:p>
             <a:fld id="{7A76B3C4-3CD0-459F-98BB-74D5FE78E4FF}" type="datetimeFigureOut">
               <a:rPr lang="en-US" smtClean="0"/>
-              <a:t>4/22/19</a:t>
+              <a:t>4/22/2019</a:t>
             </a:fld>
             <a:endParaRPr lang="en-US"/>
           </a:p>
@@ -985,7 +985,7 @@
           <a:p>
             <a:fld id="{7A76B3C4-3CD0-459F-98BB-74D5FE78E4FF}" type="datetimeFigureOut">
               <a:rPr lang="en-US" smtClean="0"/>
-              <a:t>4/22/19</a:t>
+              <a:t>4/22/2019</a:t>
             </a:fld>
             <a:endParaRPr lang="en-US"/>
           </a:p>
@@ -1322,7 +1322,7 @@
           <a:p>
             <a:fld id="{7A76B3C4-3CD0-459F-98BB-74D5FE78E4FF}" type="datetimeFigureOut">
               <a:rPr lang="en-US" smtClean="0"/>
-              <a:t>4/22/19</a:t>
+              <a:t>4/22/2019</a:t>
             </a:fld>
             <a:endParaRPr lang="en-US"/>
           </a:p>
@@ -1597,7 +1597,7 @@
           <a:p>
             <a:fld id="{7A76B3C4-3CD0-459F-98BB-74D5FE78E4FF}" type="datetimeFigureOut">
               <a:rPr lang="en-US" smtClean="0"/>
-              <a:t>4/22/19</a:t>
+              <a:t>4/22/2019</a:t>
             </a:fld>
             <a:endParaRPr lang="en-US"/>
           </a:p>
@@ -1976,7 +1976,7 @@
           <a:p>
             <a:fld id="{7A76B3C4-3CD0-459F-98BB-74D5FE78E4FF}" type="datetimeFigureOut">
               <a:rPr lang="en-US" smtClean="0"/>
-              <a:t>4/22/19</a:t>
+              <a:t>4/22/2019</a:t>
             </a:fld>
             <a:endParaRPr lang="en-US"/>
           </a:p>
@@ -2094,7 +2094,7 @@
           <a:p>
             <a:fld id="{7A76B3C4-3CD0-459F-98BB-74D5FE78E4FF}" type="datetimeFigureOut">
               <a:rPr lang="en-US" smtClean="0"/>
-              <a:t>4/22/19</a:t>
+              <a:t>4/22/2019</a:t>
             </a:fld>
             <a:endParaRPr lang="en-US"/>
           </a:p>
@@ -2267,7 +2267,7 @@
           <a:p>
             <a:fld id="{7A76B3C4-3CD0-459F-98BB-74D5FE78E4FF}" type="datetimeFigureOut">
               <a:rPr lang="en-US" smtClean="0"/>
-              <a:t>4/22/19</a:t>
+              <a:t>4/22/2019</a:t>
             </a:fld>
             <a:endParaRPr lang="en-US"/>
           </a:p>
@@ -2623,7 +2623,7 @@
           <a:p>
             <a:fld id="{7A76B3C4-3CD0-459F-98BB-74D5FE78E4FF}" type="datetimeFigureOut">
               <a:rPr lang="en-US" smtClean="0"/>
-              <a:t>4/22/19</a:t>
+              <a:t>4/22/2019</a:t>
             </a:fld>
             <a:endParaRPr lang="en-US"/>
           </a:p>
@@ -3002,7 +3002,7 @@
           <a:p>
             <a:fld id="{7A76B3C4-3CD0-459F-98BB-74D5FE78E4FF}" type="datetimeFigureOut">
               <a:rPr lang="en-US" smtClean="0"/>
-              <a:t>4/22/19</a:t>
+              <a:t>4/22/2019</a:t>
             </a:fld>
             <a:endParaRPr lang="en-US"/>
           </a:p>
@@ -3291,7 +3291,7 @@
           <a:p>
             <a:fld id="{7A76B3C4-3CD0-459F-98BB-74D5FE78E4FF}" type="datetimeFigureOut">
               <a:rPr lang="en-US" smtClean="0"/>
-              <a:t>4/22/19</a:t>
+              <a:t>4/22/2019</a:t>
             </a:fld>
             <a:endParaRPr lang="en-US"/>
           </a:p>
@@ -3830,7 +3830,7 @@
           <p:cNvPr id="2" name="Title 1">
             <a:extLst>
               <a:ext uri="{FF2B5EF4-FFF2-40B4-BE49-F238E27FC236}">
-                <a16:creationId xmlns:a16="http://schemas.microsoft.com/office/drawing/2014/main" xmlns="" id="{FBF330E3-9D5B-4458-8BCF-26BCE17319A2}"/>
+                <a16:creationId xmlns="" xmlns:a16="http://schemas.microsoft.com/office/drawing/2014/main" id="{FBF330E3-9D5B-4458-8BCF-26BCE17319A2}"/>
               </a:ext>
             </a:extLst>
           </p:cNvPr>
@@ -3867,7 +3867,7 @@
           <p:cNvPr id="3" name="Subtitle 2">
             <a:extLst>
               <a:ext uri="{FF2B5EF4-FFF2-40B4-BE49-F238E27FC236}">
-                <a16:creationId xmlns:a16="http://schemas.microsoft.com/office/drawing/2014/main" xmlns="" id="{CD0EFCF8-198C-45B2-968C-809029EB1454}"/>
+                <a16:creationId xmlns="" xmlns:a16="http://schemas.microsoft.com/office/drawing/2014/main" id="{CD0EFCF8-198C-45B2-968C-809029EB1454}"/>
               </a:ext>
             </a:extLst>
           </p:cNvPr>
@@ -3954,7 +3954,7 @@
           <p:cNvPr id="2" name="Title 1">
             <a:extLst>
               <a:ext uri="{FF2B5EF4-FFF2-40B4-BE49-F238E27FC236}">
-                <a16:creationId xmlns:a16="http://schemas.microsoft.com/office/drawing/2014/main" xmlns="" id="{32C4FA5A-3886-4F29-A077-64C6D9F83D52}"/>
+                <a16:creationId xmlns="" xmlns:a16="http://schemas.microsoft.com/office/drawing/2014/main" id="{32C4FA5A-3886-4F29-A077-64C6D9F83D52}"/>
               </a:ext>
             </a:extLst>
           </p:cNvPr>
@@ -3983,7 +3983,7 @@
           <p:cNvPr id="3" name="Content Placeholder 2">
             <a:extLst>
               <a:ext uri="{FF2B5EF4-FFF2-40B4-BE49-F238E27FC236}">
-                <a16:creationId xmlns:a16="http://schemas.microsoft.com/office/drawing/2014/main" xmlns="" id="{EA20996C-9E18-45CD-9470-3518848FB8AE}"/>
+                <a16:creationId xmlns="" xmlns:a16="http://schemas.microsoft.com/office/drawing/2014/main" id="{EA20996C-9E18-45CD-9470-3518848FB8AE}"/>
               </a:ext>
             </a:extLst>
           </p:cNvPr>
@@ -4132,7 +4132,7 @@
           <p:cNvPr id="2" name="Title 1">
             <a:extLst>
               <a:ext uri="{FF2B5EF4-FFF2-40B4-BE49-F238E27FC236}">
-                <a16:creationId xmlns:a16="http://schemas.microsoft.com/office/drawing/2014/main" xmlns="" id="{E1D6E6BA-1056-40AD-96D0-D9D4B0E781AA}"/>
+                <a16:creationId xmlns="" xmlns:a16="http://schemas.microsoft.com/office/drawing/2014/main" id="{E1D6E6BA-1056-40AD-96D0-D9D4B0E781AA}"/>
               </a:ext>
             </a:extLst>
           </p:cNvPr>
@@ -4163,7 +4163,7 @@
           <p:cNvPr id="3" name="Content Placeholder 2">
             <a:extLst>
               <a:ext uri="{FF2B5EF4-FFF2-40B4-BE49-F238E27FC236}">
-                <a16:creationId xmlns:a16="http://schemas.microsoft.com/office/drawing/2014/main" xmlns="" id="{6C9AF785-730C-42AB-BF50-7EFF47A5BF40}"/>
+                <a16:creationId xmlns="" xmlns:a16="http://schemas.microsoft.com/office/drawing/2014/main" id="{6C9AF785-730C-42AB-BF50-7EFF47A5BF40}"/>
               </a:ext>
             </a:extLst>
           </p:cNvPr>
@@ -4307,7 +4307,7 @@
           <p:cNvPr id="2" name="Title 1">
             <a:extLst>
               <a:ext uri="{FF2B5EF4-FFF2-40B4-BE49-F238E27FC236}">
-                <a16:creationId xmlns:a16="http://schemas.microsoft.com/office/drawing/2014/main" xmlns="" id="{3A3FE167-5BE7-423C-91E7-EB1FCD5D89FD}"/>
+                <a16:creationId xmlns="" xmlns:a16="http://schemas.microsoft.com/office/drawing/2014/main" id="{1602D727-634E-44C8-86AA-0173EB675CF3}"/>
               </a:ext>
             </a:extLst>
           </p:cNvPr>
@@ -4325,46 +4325,95 @@
           <a:p>
             <a:pPr algn="ctr"/>
             <a:r>
-              <a:rPr lang="en-US" sz="6000" dirty="0" err="1"/>
-              <a:t>Datamodel</a:t>
-            </a:r>
-            <a:endParaRPr lang="en-US" dirty="0"/>
-          </a:p>
-        </p:txBody>
-      </p:sp>
-      <p:pic>
-        <p:nvPicPr>
-          <p:cNvPr id="4" name="Content Placeholder 3"/>
-          <p:cNvPicPr>
-            <a:picLocks noGrp="1" noChangeAspect="1"/>
-          </p:cNvPicPr>
-          <p:nvPr>
-            <p:ph idx="1"/>
-          </p:nvPr>
-        </p:nvPicPr>
-        <p:blipFill>
-          <a:blip r:embed="rId2">
+              <a:rPr lang="en-US" dirty="0"/>
+              <a:t>Next Level Funding</a:t>
+            </a:r>
+          </a:p>
+        </p:txBody>
+      </p:sp>
+      <p:sp>
+        <p:nvSpPr>
+          <p:cNvPr id="3" name="Content Placeholder 2">
             <a:extLst>
-              <a:ext uri="{28A0092B-C50C-407E-A947-70E740481C1C}">
-                <a14:useLocalDpi xmlns:a14="http://schemas.microsoft.com/office/drawing/2010/main" val="0"/>
+              <a:ext uri="{FF2B5EF4-FFF2-40B4-BE49-F238E27FC236}">
+                <a16:creationId xmlns="" xmlns:a16="http://schemas.microsoft.com/office/drawing/2014/main" id="{7C661A7A-7E75-435E-9E4D-C8B63C70B4F8}"/>
               </a:ext>
             </a:extLst>
-          </a:blip>
-          <a:stretch>
-            <a:fillRect/>
-          </a:stretch>
-        </p:blipFill>
-        <p:spPr>
-          <a:xfrm>
-            <a:off x="2086766" y="1737360"/>
-            <a:ext cx="8079428" cy="4599135"/>
-          </a:xfrm>
-        </p:spPr>
-      </p:pic>
+          </p:cNvPr>
+          <p:cNvSpPr>
+            <a:spLocks noGrp="1"/>
+          </p:cNvSpPr>
+          <p:nvPr>
+            <p:ph idx="1"/>
+          </p:nvPr>
+        </p:nvSpPr>
+        <p:spPr/>
+        <p:txBody>
+          <a:bodyPr/>
+          <a:lstStyle/>
+          <a:p>
+            <a:r>
+              <a:rPr lang="en-US" sz="3200" dirty="0"/>
+              <a:t>By 2023 the worldwide ticket industry will:</a:t>
+            </a:r>
+          </a:p>
+          <a:p>
+            <a:pPr lvl="1"/>
+            <a:r>
+              <a:rPr lang="en-US" sz="2800" dirty="0"/>
+              <a:t>Be a $105 Billion Market [1]</a:t>
+            </a:r>
+          </a:p>
+          <a:p>
+            <a:pPr lvl="1"/>
+            <a:r>
+              <a:rPr lang="en-US" sz="2800" dirty="0"/>
+              <a:t>Be used by 1.1 Billion Customers [1]</a:t>
+            </a:r>
+          </a:p>
+          <a:p>
+            <a:pPr marL="201168" lvl="1" indent="0">
+              <a:buNone/>
+            </a:pPr>
+            <a:endParaRPr lang="en-US" sz="2800" dirty="0"/>
+          </a:p>
+          <a:p>
+            <a:pPr marL="201168" lvl="1" indent="0">
+              <a:buNone/>
+            </a:pPr>
+            <a:r>
+              <a:rPr lang="en-US" sz="3200" dirty="0"/>
+              <a:t>In the US alone: 8.3% annual growth</a:t>
+            </a:r>
+            <a:r>
+              <a:rPr lang="en-US" sz="2800" dirty="0"/>
+              <a:t> [2]</a:t>
+            </a:r>
+          </a:p>
+          <a:p>
+            <a:pPr marL="201168" lvl="1" indent="0">
+              <a:buNone/>
+            </a:pPr>
+            <a:endParaRPr lang="en-US" sz="2800" dirty="0"/>
+          </a:p>
+          <a:p>
+            <a:pPr marL="201168" lvl="1" indent="0">
+              <a:buNone/>
+            </a:pPr>
+            <a:r>
+              <a:rPr lang="en-US" sz="3200" dirty="0"/>
+              <a:t>Expanding Encore Tickets to accommodate Cinematic and Sports events will increase revenue.</a:t>
+            </a:r>
+          </a:p>
+          <a:p>
+            <a:endParaRPr lang="en-US" dirty="0"/>
+          </a:p>
+        </p:txBody>
+      </p:sp>
     </p:spTree>
     <p:extLst>
       <p:ext uri="{BB962C8B-B14F-4D97-AF65-F5344CB8AC3E}">
-        <p14:creationId xmlns:p14="http://schemas.microsoft.com/office/powerpoint/2010/main" val="1367638084"/>
+        <p14:creationId xmlns:p14="http://schemas.microsoft.com/office/powerpoint/2010/main" val="196948688"/>
       </p:ext>
     </p:extLst>
   </p:cSld>
@@ -4406,7 +4455,7 @@
           <p:cNvPr id="2" name="Title 1">
             <a:extLst>
               <a:ext uri="{FF2B5EF4-FFF2-40B4-BE49-F238E27FC236}">
-                <a16:creationId xmlns:a16="http://schemas.microsoft.com/office/drawing/2014/main" xmlns="" id="{3DE87B98-304B-42C1-8B25-40FAD7E20882}"/>
+                <a16:creationId xmlns="" xmlns:a16="http://schemas.microsoft.com/office/drawing/2014/main" id="{2C49DF4A-A90A-4B7A-85C9-1C24BFCCEE6E}"/>
               </a:ext>
             </a:extLst>
           </p:cNvPr>
@@ -4422,11 +4471,6 @@
           <a:bodyPr/>
           <a:lstStyle/>
           <a:p>
-            <a:pPr algn="ctr"/>
-            <a:r>
-              <a:rPr lang="en-US" sz="6000" dirty="0"/>
-              <a:t>Demonstration</a:t>
-            </a:r>
             <a:endParaRPr lang="en-US" dirty="0"/>
           </a:p>
         </p:txBody>
@@ -4436,7 +4480,7 @@
           <p:cNvPr id="3" name="Content Placeholder 2">
             <a:extLst>
               <a:ext uri="{FF2B5EF4-FFF2-40B4-BE49-F238E27FC236}">
-                <a16:creationId xmlns:a16="http://schemas.microsoft.com/office/drawing/2014/main" xmlns="" id="{654BF180-CF6A-46F9-B53D-5F2D67CA5F8F}"/>
+                <a16:creationId xmlns="" xmlns:a16="http://schemas.microsoft.com/office/drawing/2014/main" id="{D3F6BE42-0A95-4762-9AA8-0072612E5AF4}"/>
               </a:ext>
             </a:extLst>
           </p:cNvPr>
@@ -4456,10 +4500,75 @@
           </a:p>
         </p:txBody>
       </p:sp>
+      <p:pic>
+        <p:nvPicPr>
+          <p:cNvPr id="10" name="Picture 9">
+            <a:extLst>
+              <a:ext uri="{FF2B5EF4-FFF2-40B4-BE49-F238E27FC236}">
+                <a16:creationId xmlns="" xmlns:a16="http://schemas.microsoft.com/office/drawing/2014/main" id="{5770ACB9-CF72-4156-BF5F-E51B787B53F4}"/>
+              </a:ext>
+            </a:extLst>
+          </p:cNvPr>
+          <p:cNvPicPr>
+            <a:picLocks noChangeAspect="1"/>
+          </p:cNvPicPr>
+          <p:nvPr/>
+        </p:nvPicPr>
+        <p:blipFill>
+          <a:blip r:embed="rId2"/>
+          <a:stretch>
+            <a:fillRect/>
+          </a:stretch>
+        </p:blipFill>
+        <p:spPr>
+          <a:xfrm>
+            <a:off x="0" y="-13671"/>
+            <a:ext cx="12192000" cy="6871671"/>
+          </a:xfrm>
+          <a:prstGeom prst="rect">
+            <a:avLst/>
+          </a:prstGeom>
+        </p:spPr>
+      </p:pic>
+      <p:sp>
+        <p:nvSpPr>
+          <p:cNvPr id="11" name="TextBox 10">
+            <a:extLst>
+              <a:ext uri="{FF2B5EF4-FFF2-40B4-BE49-F238E27FC236}">
+                <a16:creationId xmlns="" xmlns:a16="http://schemas.microsoft.com/office/drawing/2014/main" id="{A852D194-0C06-4155-BBF8-6C051F5C22F5}"/>
+              </a:ext>
+            </a:extLst>
+          </p:cNvPr>
+          <p:cNvSpPr txBox="1"/>
+          <p:nvPr/>
+        </p:nvSpPr>
+        <p:spPr>
+          <a:xfrm>
+            <a:off x="10819771" y="5869094"/>
+            <a:ext cx="549897" cy="400110"/>
+          </a:xfrm>
+          <a:prstGeom prst="rect">
+            <a:avLst/>
+          </a:prstGeom>
+          <a:noFill/>
+        </p:spPr>
+        <p:txBody>
+          <a:bodyPr wrap="square" rtlCol="0">
+            <a:spAutoFit/>
+          </a:bodyPr>
+          <a:lstStyle/>
+          <a:p>
+            <a:r>
+              <a:rPr lang="en-US" sz="2000" dirty="0"/>
+              <a:t>[1]</a:t>
+            </a:r>
+          </a:p>
+        </p:txBody>
+      </p:sp>
     </p:spTree>
     <p:extLst>
       <p:ext uri="{BB962C8B-B14F-4D97-AF65-F5344CB8AC3E}">
-        <p14:creationId xmlns:p14="http://schemas.microsoft.com/office/powerpoint/2010/main" val="2884728582"/>
+        <p14:creationId xmlns:p14="http://schemas.microsoft.com/office/powerpoint/2010/main" val="959148159"/>
       </p:ext>
     </p:extLst>
   </p:cSld>
@@ -4501,7 +4610,7 @@
           <p:cNvPr id="2" name="Title 1">
             <a:extLst>
               <a:ext uri="{FF2B5EF4-FFF2-40B4-BE49-F238E27FC236}">
-                <a16:creationId xmlns:a16="http://schemas.microsoft.com/office/drawing/2014/main" xmlns="" id="{B710DC17-3948-4282-A1B7-A9D1AEB4E485}"/>
+                <a16:creationId xmlns="" xmlns:a16="http://schemas.microsoft.com/office/drawing/2014/main" id="{8783FB70-CFB1-4049-90A7-8A85A4FA70EB}"/>
               </a:ext>
             </a:extLst>
           </p:cNvPr>
@@ -4517,12 +4626,7 @@
           <a:bodyPr/>
           <a:lstStyle/>
           <a:p>
-            <a:pPr algn="ctr"/>
-            <a:r>
-              <a:rPr lang="en-US" sz="6000" dirty="0"/>
-              <a:t>Problems and Solutions</a:t>
-            </a:r>
-            <a:endParaRPr lang="en-US" dirty="0"/>
+            <a:endParaRPr lang="en-US"/>
           </a:p>
         </p:txBody>
       </p:sp>
@@ -4531,7 +4635,7 @@
           <p:cNvPr id="3" name="Content Placeholder 2">
             <a:extLst>
               <a:ext uri="{FF2B5EF4-FFF2-40B4-BE49-F238E27FC236}">
-                <a16:creationId xmlns:a16="http://schemas.microsoft.com/office/drawing/2014/main" xmlns="" id="{76285C5E-7BC1-47DE-941B-2C622FFEB19B}"/>
+                <a16:creationId xmlns="" xmlns:a16="http://schemas.microsoft.com/office/drawing/2014/main" id="{6A515C07-4F6E-46BD-B8B2-E03B7463CB18}"/>
               </a:ext>
             </a:extLst>
           </p:cNvPr>
@@ -4544,89 +4648,82 @@
         </p:nvSpPr>
         <p:spPr/>
         <p:txBody>
-          <a:bodyPr>
-            <a:normAutofit lnSpcReduction="10000"/>
+          <a:bodyPr/>
+          <a:lstStyle/>
+          <a:p>
+            <a:endParaRPr lang="en-US" dirty="0"/>
+          </a:p>
+        </p:txBody>
+      </p:sp>
+      <p:pic>
+        <p:nvPicPr>
+          <p:cNvPr id="9" name="Picture 8">
+            <a:extLst>
+              <a:ext uri="{FF2B5EF4-FFF2-40B4-BE49-F238E27FC236}">
+                <a16:creationId xmlns="" xmlns:a16="http://schemas.microsoft.com/office/drawing/2014/main" id="{47E0FD5E-DEFC-462D-BBCF-34E6F624FFF2}"/>
+              </a:ext>
+            </a:extLst>
+          </p:cNvPr>
+          <p:cNvPicPr>
+            <a:picLocks noChangeAspect="1"/>
+          </p:cNvPicPr>
+          <p:nvPr/>
+        </p:nvPicPr>
+        <p:blipFill>
+          <a:blip r:embed="rId2"/>
+          <a:stretch>
+            <a:fillRect/>
+          </a:stretch>
+        </p:blipFill>
+        <p:spPr>
+          <a:xfrm>
+            <a:off x="-10159" y="-5096"/>
+            <a:ext cx="12191998" cy="6868192"/>
+          </a:xfrm>
+          <a:prstGeom prst="rect">
+            <a:avLst/>
+          </a:prstGeom>
+        </p:spPr>
+      </p:pic>
+      <p:sp>
+        <p:nvSpPr>
+          <p:cNvPr id="10" name="TextBox 9">
+            <a:extLst>
+              <a:ext uri="{FF2B5EF4-FFF2-40B4-BE49-F238E27FC236}">
+                <a16:creationId xmlns="" xmlns:a16="http://schemas.microsoft.com/office/drawing/2014/main" id="{213C964C-3F44-4B49-8B8E-F9D5469FA7E9}"/>
+              </a:ext>
+            </a:extLst>
+          </p:cNvPr>
+          <p:cNvSpPr txBox="1"/>
+          <p:nvPr/>
+        </p:nvSpPr>
+        <p:spPr>
+          <a:xfrm>
+            <a:off x="10962535" y="5902962"/>
+            <a:ext cx="549897" cy="400110"/>
+          </a:xfrm>
+          <a:prstGeom prst="rect">
+            <a:avLst/>
+          </a:prstGeom>
+          <a:noFill/>
+        </p:spPr>
+        <p:txBody>
+          <a:bodyPr wrap="square" rtlCol="0">
+            <a:spAutoFit/>
           </a:bodyPr>
           <a:lstStyle/>
           <a:p>
-            <a:pPr lvl="1"/>
-            <a:r>
-              <a:rPr lang="en-US" sz="2800" dirty="0" smtClean="0"/>
-              <a:t>Data generation</a:t>
-            </a:r>
-            <a:endParaRPr lang="en-US" sz="2800" dirty="0"/>
-          </a:p>
-          <a:p>
-            <a:pPr lvl="2"/>
-            <a:r>
-              <a:rPr lang="en-US" sz="2400" dirty="0" smtClean="0"/>
-              <a:t>Thought we could automate, but were unable too</a:t>
-            </a:r>
-            <a:endParaRPr lang="en-US" sz="2400" dirty="0"/>
-          </a:p>
-          <a:p>
-            <a:pPr lvl="4"/>
-            <a:r>
-              <a:rPr lang="en-US" sz="2400" dirty="0" smtClean="0"/>
-              <a:t>Ended up writing out all data and insert statements by hand</a:t>
-            </a:r>
-          </a:p>
-          <a:p>
-            <a:pPr lvl="1"/>
-            <a:r>
-              <a:rPr lang="en-US" sz="2800" dirty="0" smtClean="0"/>
-              <a:t>Queries</a:t>
-            </a:r>
-          </a:p>
-          <a:p>
-            <a:pPr lvl="2"/>
-            <a:r>
-              <a:rPr lang="en-US" sz="2400" dirty="0" smtClean="0"/>
-              <a:t>Kept generating spurious tuples</a:t>
-            </a:r>
-          </a:p>
-          <a:p>
-            <a:pPr lvl="4"/>
-            <a:r>
-              <a:rPr lang="en-US" sz="2400" dirty="0" smtClean="0"/>
-              <a:t>Tried a few different statements and found the ones that worked</a:t>
-            </a:r>
-          </a:p>
-          <a:p>
-            <a:pPr lvl="1"/>
-            <a:r>
-              <a:rPr lang="en-US" sz="2800" dirty="0" smtClean="0"/>
-              <a:t>Insertions</a:t>
-            </a:r>
-          </a:p>
-          <a:p>
-            <a:pPr lvl="2"/>
-            <a:r>
-              <a:rPr lang="en-US" sz="2400" dirty="0" smtClean="0"/>
-              <a:t>Getting errors</a:t>
-            </a:r>
-          </a:p>
-          <a:p>
-            <a:pPr lvl="4"/>
-            <a:r>
-              <a:rPr lang="en-US" sz="2400" dirty="0" smtClean="0"/>
-              <a:t>Had to go through all hand written insertions and eventually found the errors</a:t>
-            </a:r>
-            <a:endParaRPr lang="en-US" sz="2400" dirty="0"/>
-          </a:p>
-          <a:p>
-            <a:pPr lvl="2"/>
-            <a:endParaRPr lang="en-US" sz="2400" dirty="0"/>
-          </a:p>
-          <a:p>
-            <a:endParaRPr lang="en-US" dirty="0" smtClean="0"/>
+            <a:r>
+              <a:rPr lang="en-US" sz="2000" dirty="0"/>
+              <a:t>[1]</a:t>
+            </a:r>
           </a:p>
         </p:txBody>
       </p:sp>
     </p:spTree>
     <p:extLst>
       <p:ext uri="{BB962C8B-B14F-4D97-AF65-F5344CB8AC3E}">
-        <p14:creationId xmlns:p14="http://schemas.microsoft.com/office/powerpoint/2010/main" val="1271762142"/>
+        <p14:creationId xmlns:p14="http://schemas.microsoft.com/office/powerpoint/2010/main" val="3419845302"/>
       </p:ext>
     </p:extLst>
   </p:cSld>
@@ -4668,7 +4765,7 @@
           <p:cNvPr id="2" name="Title 1">
             <a:extLst>
               <a:ext uri="{FF2B5EF4-FFF2-40B4-BE49-F238E27FC236}">
-                <a16:creationId xmlns:a16="http://schemas.microsoft.com/office/drawing/2014/main" xmlns="" id="{1602D727-634E-44C8-86AA-0173EB675CF3}"/>
+                <a16:creationId xmlns="" xmlns:a16="http://schemas.microsoft.com/office/drawing/2014/main" id="{3A3FE167-5BE7-423C-91E7-EB1FCD5D89FD}"/>
               </a:ext>
             </a:extLst>
           </p:cNvPr>
@@ -4686,95 +4783,46 @@
           <a:p>
             <a:pPr algn="ctr"/>
             <a:r>
-              <a:rPr lang="en-US" dirty="0"/>
-              <a:t>Next Level Funding</a:t>
-            </a:r>
-          </a:p>
-        </p:txBody>
-      </p:sp>
-      <p:sp>
-        <p:nvSpPr>
-          <p:cNvPr id="3" name="Content Placeholder 2">
+              <a:rPr lang="en-US" sz="6000" dirty="0" smtClean="0"/>
+              <a:t>Data model - ERD</a:t>
+            </a:r>
+            <a:endParaRPr lang="en-US" dirty="0"/>
+          </a:p>
+        </p:txBody>
+      </p:sp>
+      <p:pic>
+        <p:nvPicPr>
+          <p:cNvPr id="4" name="Content Placeholder 3"/>
+          <p:cNvPicPr>
+            <a:picLocks noGrp="1" noChangeAspect="1"/>
+          </p:cNvPicPr>
+          <p:nvPr>
+            <p:ph idx="1"/>
+          </p:nvPr>
+        </p:nvPicPr>
+        <p:blipFill>
+          <a:blip r:embed="rId2">
             <a:extLst>
-              <a:ext uri="{FF2B5EF4-FFF2-40B4-BE49-F238E27FC236}">
-                <a16:creationId xmlns:a16="http://schemas.microsoft.com/office/drawing/2014/main" xmlns="" id="{7C661A7A-7E75-435E-9E4D-C8B63C70B4F8}"/>
+              <a:ext uri="{28A0092B-C50C-407E-A947-70E740481C1C}">
+                <a14:useLocalDpi xmlns:a14="http://schemas.microsoft.com/office/drawing/2010/main" val="0"/>
               </a:ext>
             </a:extLst>
-          </p:cNvPr>
-          <p:cNvSpPr>
-            <a:spLocks noGrp="1"/>
-          </p:cNvSpPr>
-          <p:nvPr>
-            <p:ph idx="1"/>
-          </p:nvPr>
-        </p:nvSpPr>
-        <p:spPr/>
-        <p:txBody>
-          <a:bodyPr/>
-          <a:lstStyle/>
-          <a:p>
-            <a:r>
-              <a:rPr lang="en-US" sz="3200" dirty="0"/>
-              <a:t>By 2023 the worldwide ticket industry will:</a:t>
-            </a:r>
-          </a:p>
-          <a:p>
-            <a:pPr lvl="1"/>
-            <a:r>
-              <a:rPr lang="en-US" sz="2800" dirty="0"/>
-              <a:t>Be a $105 Billion Market [1]</a:t>
-            </a:r>
-          </a:p>
-          <a:p>
-            <a:pPr lvl="1"/>
-            <a:r>
-              <a:rPr lang="en-US" sz="2800" dirty="0"/>
-              <a:t>Be used by 1.1 Billion Customers [1]</a:t>
-            </a:r>
-          </a:p>
-          <a:p>
-            <a:pPr marL="201168" lvl="1" indent="0">
-              <a:buNone/>
-            </a:pPr>
-            <a:endParaRPr lang="en-US" sz="2800" dirty="0"/>
-          </a:p>
-          <a:p>
-            <a:pPr marL="201168" lvl="1" indent="0">
-              <a:buNone/>
-            </a:pPr>
-            <a:r>
-              <a:rPr lang="en-US" sz="3200" dirty="0"/>
-              <a:t>In the US alone: 8.3% annual growth</a:t>
-            </a:r>
-            <a:r>
-              <a:rPr lang="en-US" sz="2800" dirty="0"/>
-              <a:t> [2]</a:t>
-            </a:r>
-          </a:p>
-          <a:p>
-            <a:pPr marL="201168" lvl="1" indent="0">
-              <a:buNone/>
-            </a:pPr>
-            <a:endParaRPr lang="en-US" sz="2800" dirty="0"/>
-          </a:p>
-          <a:p>
-            <a:pPr marL="201168" lvl="1" indent="0">
-              <a:buNone/>
-            </a:pPr>
-            <a:r>
-              <a:rPr lang="en-US" sz="3200" dirty="0"/>
-              <a:t>Expanding Encore Tickets to accommodate Cinematic and Sports events will increase revenue.</a:t>
-            </a:r>
-          </a:p>
-          <a:p>
-            <a:endParaRPr lang="en-US" dirty="0"/>
-          </a:p>
-        </p:txBody>
-      </p:sp>
+          </a:blip>
+          <a:stretch>
+            <a:fillRect/>
+          </a:stretch>
+        </p:blipFill>
+        <p:spPr>
+          <a:xfrm>
+            <a:off x="2086766" y="1737360"/>
+            <a:ext cx="8079428" cy="4599135"/>
+          </a:xfrm>
+        </p:spPr>
+      </p:pic>
     </p:spTree>
     <p:extLst>
       <p:ext uri="{BB962C8B-B14F-4D97-AF65-F5344CB8AC3E}">
-        <p14:creationId xmlns:p14="http://schemas.microsoft.com/office/powerpoint/2010/main" val="196948688"/>
+        <p14:creationId xmlns:p14="http://schemas.microsoft.com/office/powerpoint/2010/main" val="1367638084"/>
       </p:ext>
     </p:extLst>
   </p:cSld>
@@ -4787,16 +4835,6 @@
 <file path=ppt/slides/slide7.xml><?xml version="1.0" encoding="utf-8"?>
 <p:sld xmlns:a="http://schemas.openxmlformats.org/drawingml/2006/main" xmlns:r="http://schemas.openxmlformats.org/officeDocument/2006/relationships" xmlns:p="http://schemas.openxmlformats.org/presentationml/2006/main">
   <p:cSld>
-    <p:bg>
-      <p:bgPr>
-        <a:solidFill>
-          <a:schemeClr val="bg1">
-            <a:lumMod val="95000"/>
-          </a:schemeClr>
-        </a:solidFill>
-        <a:effectLst/>
-      </p:bgPr>
-    </p:bg>
     <p:spTree>
       <p:nvGrpSpPr>
         <p:cNvPr id="1" name=""/>
@@ -4813,13 +4851,7 @@
       </p:grpSpPr>
       <p:sp>
         <p:nvSpPr>
-          <p:cNvPr id="2" name="Title 1">
-            <a:extLst>
-              <a:ext uri="{FF2B5EF4-FFF2-40B4-BE49-F238E27FC236}">
-                <a16:creationId xmlns:a16="http://schemas.microsoft.com/office/drawing/2014/main" xmlns="" id="{2C49DF4A-A90A-4B7A-85C9-1C24BFCCEE6E}"/>
-              </a:ext>
-            </a:extLst>
-          </p:cNvPr>
+          <p:cNvPr id="2" name="Title 1"/>
           <p:cNvSpPr>
             <a:spLocks noGrp="1"/>
           </p:cNvSpPr>
@@ -4832,81 +4864,420 @@
           <a:bodyPr/>
           <a:lstStyle/>
           <a:p>
+            <a:pPr algn="ctr"/>
+            <a:r>
+              <a:rPr lang="en-US" dirty="0" smtClean="0"/>
+              <a:t>Data Model - Schema</a:t>
+            </a:r>
             <a:endParaRPr lang="en-US" dirty="0"/>
           </a:p>
         </p:txBody>
       </p:sp>
-      <p:sp>
-        <p:nvSpPr>
-          <p:cNvPr id="3" name="Content Placeholder 2">
-            <a:extLst>
-              <a:ext uri="{FF2B5EF4-FFF2-40B4-BE49-F238E27FC236}">
-                <a16:creationId xmlns:a16="http://schemas.microsoft.com/office/drawing/2014/main" xmlns="" id="{D3F6BE42-0A95-4762-9AA8-0072612E5AF4}"/>
-              </a:ext>
-            </a:extLst>
-          </p:cNvPr>
-          <p:cNvSpPr>
-            <a:spLocks noGrp="1"/>
-          </p:cNvSpPr>
+      <p:graphicFrame>
+        <p:nvGraphicFramePr>
+          <p:cNvPr id="5" name="Table 4"/>
+          <p:cNvGraphicFramePr>
+            <a:graphicFrameLocks noGrp="1"/>
+          </p:cNvGraphicFramePr>
+          <p:nvPr>
+            <p:extLst>
+              <p:ext uri="{D42A27DB-BD31-4B8C-83A1-F6EECF244321}">
+                <p14:modId xmlns:p14="http://schemas.microsoft.com/office/powerpoint/2010/main" val="3360902156"/>
+              </p:ext>
+            </p:extLst>
+          </p:nvPr>
+        </p:nvGraphicFramePr>
+        <p:xfrm>
+          <a:off x="1096963" y="3139963"/>
+          <a:ext cx="5937250" cy="317627"/>
+        </p:xfrm>
+        <a:graphic>
+          <a:graphicData uri="http://schemas.openxmlformats.org/drawingml/2006/table">
+            <a:tbl>
+              <a:tblPr firstRow="1" firstCol="1" bandRow="1">
+                <a:tableStyleId>{5C22544A-7EE6-4342-B048-85BDC9FD1C3A}</a:tableStyleId>
+              </a:tblPr>
+              <a:tblGrid>
+                <a:gridCol w="1187450"/>
+                <a:gridCol w="1187450"/>
+                <a:gridCol w="1187450"/>
+                <a:gridCol w="1187450"/>
+                <a:gridCol w="1187450"/>
+              </a:tblGrid>
+              <a:tr h="317627">
+                <a:tc>
+                  <a:txBody>
+                    <a:bodyPr/>
+                    <a:lstStyle/>
+                    <a:p>
+                      <a:pPr marL="0" marR="0">
+                        <a:lnSpc>
+                          <a:spcPct val="107000"/>
+                        </a:lnSpc>
+                        <a:spcBef>
+                          <a:spcPts val="0"/>
+                        </a:spcBef>
+                        <a:spcAft>
+                          <a:spcPts val="0"/>
+                        </a:spcAft>
+                      </a:pPr>
+                      <a:r>
+                        <a:rPr lang="en-US" sz="1200" dirty="0">
+                          <a:effectLst/>
+                        </a:rPr>
+                        <a:t>Venue ID</a:t>
+                      </a:r>
+                      <a:endParaRPr lang="en-US" sz="1200" dirty="0">
+                        <a:effectLst/>
+                        <a:latin typeface="Calibri" panose="020F0502020204030204" pitchFamily="34" charset="0"/>
+                        <a:ea typeface="Calibri" panose="020F0502020204030204" pitchFamily="34" charset="0"/>
+                        <a:cs typeface="Times New Roman" panose="02020603050405020304" pitchFamily="18" charset="0"/>
+                      </a:endParaRPr>
+                    </a:p>
+                  </a:txBody>
+                  <a:tcPr marL="68580" marR="68580" marT="0" marB="0"/>
+                </a:tc>
+                <a:tc>
+                  <a:txBody>
+                    <a:bodyPr/>
+                    <a:lstStyle/>
+                    <a:p>
+                      <a:pPr marL="0" marR="0">
+                        <a:lnSpc>
+                          <a:spcPct val="107000"/>
+                        </a:lnSpc>
+                        <a:spcBef>
+                          <a:spcPts val="0"/>
+                        </a:spcBef>
+                        <a:spcAft>
+                          <a:spcPts val="0"/>
+                        </a:spcAft>
+                      </a:pPr>
+                      <a:r>
+                        <a:rPr lang="en-US" sz="1200">
+                          <a:effectLst/>
+                        </a:rPr>
+                        <a:t>Venue Name</a:t>
+                      </a:r>
+                      <a:endParaRPr lang="en-US" sz="1200">
+                        <a:effectLst/>
+                        <a:latin typeface="Calibri" panose="020F0502020204030204" pitchFamily="34" charset="0"/>
+                        <a:ea typeface="Calibri" panose="020F0502020204030204" pitchFamily="34" charset="0"/>
+                        <a:cs typeface="Times New Roman" panose="02020603050405020304" pitchFamily="18" charset="0"/>
+                      </a:endParaRPr>
+                    </a:p>
+                  </a:txBody>
+                  <a:tcPr marL="68580" marR="68580" marT="0" marB="0"/>
+                </a:tc>
+                <a:tc>
+                  <a:txBody>
+                    <a:bodyPr/>
+                    <a:lstStyle/>
+                    <a:p>
+                      <a:pPr marL="0" marR="0">
+                        <a:lnSpc>
+                          <a:spcPct val="107000"/>
+                        </a:lnSpc>
+                        <a:spcBef>
+                          <a:spcPts val="0"/>
+                        </a:spcBef>
+                        <a:spcAft>
+                          <a:spcPts val="0"/>
+                        </a:spcAft>
+                      </a:pPr>
+                      <a:r>
+                        <a:rPr lang="en-US" sz="1200">
+                          <a:effectLst/>
+                        </a:rPr>
+                        <a:t>Address</a:t>
+                      </a:r>
+                      <a:endParaRPr lang="en-US" sz="1200">
+                        <a:effectLst/>
+                        <a:latin typeface="Calibri" panose="020F0502020204030204" pitchFamily="34" charset="0"/>
+                        <a:ea typeface="Calibri" panose="020F0502020204030204" pitchFamily="34" charset="0"/>
+                        <a:cs typeface="Times New Roman" panose="02020603050405020304" pitchFamily="18" charset="0"/>
+                      </a:endParaRPr>
+                    </a:p>
+                  </a:txBody>
+                  <a:tcPr marL="68580" marR="68580" marT="0" marB="0"/>
+                </a:tc>
+                <a:tc>
+                  <a:txBody>
+                    <a:bodyPr/>
+                    <a:lstStyle/>
+                    <a:p>
+                      <a:pPr marL="0" marR="0">
+                        <a:lnSpc>
+                          <a:spcPct val="107000"/>
+                        </a:lnSpc>
+                        <a:spcBef>
+                          <a:spcPts val="0"/>
+                        </a:spcBef>
+                        <a:spcAft>
+                          <a:spcPts val="0"/>
+                        </a:spcAft>
+                      </a:pPr>
+                      <a:r>
+                        <a:rPr lang="en-US" sz="1200">
+                          <a:effectLst/>
+                        </a:rPr>
+                        <a:t>Next Performer</a:t>
+                      </a:r>
+                      <a:endParaRPr lang="en-US" sz="1200">
+                        <a:effectLst/>
+                        <a:latin typeface="Calibri" panose="020F0502020204030204" pitchFamily="34" charset="0"/>
+                        <a:ea typeface="Calibri" panose="020F0502020204030204" pitchFamily="34" charset="0"/>
+                        <a:cs typeface="Times New Roman" panose="02020603050405020304" pitchFamily="18" charset="0"/>
+                      </a:endParaRPr>
+                    </a:p>
+                  </a:txBody>
+                  <a:tcPr marL="68580" marR="68580" marT="0" marB="0"/>
+                </a:tc>
+                <a:tc>
+                  <a:txBody>
+                    <a:bodyPr/>
+                    <a:lstStyle/>
+                    <a:p>
+                      <a:pPr marL="0" marR="0">
+                        <a:lnSpc>
+                          <a:spcPct val="107000"/>
+                        </a:lnSpc>
+                        <a:spcBef>
+                          <a:spcPts val="0"/>
+                        </a:spcBef>
+                        <a:spcAft>
+                          <a:spcPts val="0"/>
+                        </a:spcAft>
+                      </a:pPr>
+                      <a:r>
+                        <a:rPr lang="en-US" sz="1200" dirty="0">
+                          <a:effectLst/>
+                        </a:rPr>
+                        <a:t>Next Event Date</a:t>
+                      </a:r>
+                      <a:endParaRPr lang="en-US" sz="1200" dirty="0">
+                        <a:effectLst/>
+                        <a:latin typeface="Calibri" panose="020F0502020204030204" pitchFamily="34" charset="0"/>
+                        <a:ea typeface="Calibri" panose="020F0502020204030204" pitchFamily="34" charset="0"/>
+                        <a:cs typeface="Times New Roman" panose="02020603050405020304" pitchFamily="18" charset="0"/>
+                      </a:endParaRPr>
+                    </a:p>
+                  </a:txBody>
+                  <a:tcPr marL="68580" marR="68580" marT="0" marB="0"/>
+                </a:tc>
+              </a:tr>
+            </a:tbl>
+          </a:graphicData>
+        </a:graphic>
+      </p:graphicFrame>
+      <p:graphicFrame>
+        <p:nvGraphicFramePr>
+          <p:cNvPr id="7" name="Content Placeholder 6"/>
+          <p:cNvGraphicFramePr>
+            <a:graphicFrameLocks noGrp="1"/>
+          </p:cNvGraphicFramePr>
           <p:nvPr>
             <p:ph idx="1"/>
-          </p:nvPr>
-        </p:nvSpPr>
-        <p:spPr/>
-        <p:txBody>
-          <a:bodyPr/>
-          <a:lstStyle/>
-          <a:p>
-            <a:endParaRPr lang="en-US" dirty="0"/>
-          </a:p>
-        </p:txBody>
-      </p:sp>
-      <p:pic>
-        <p:nvPicPr>
-          <p:cNvPr id="10" name="Picture 9">
-            <a:extLst>
-              <a:ext uri="{FF2B5EF4-FFF2-40B4-BE49-F238E27FC236}">
-                <a16:creationId xmlns:a16="http://schemas.microsoft.com/office/drawing/2014/main" xmlns="" id="{5770ACB9-CF72-4156-BF5F-E51B787B53F4}"/>
-              </a:ext>
-            </a:extLst>
-          </p:cNvPr>
-          <p:cNvPicPr>
-            <a:picLocks noChangeAspect="1"/>
-          </p:cNvPicPr>
+            <p:extLst>
+              <p:ext uri="{D42A27DB-BD31-4B8C-83A1-F6EECF244321}">
+                <p14:modId xmlns:p14="http://schemas.microsoft.com/office/powerpoint/2010/main" val="2212067408"/>
+              </p:ext>
+            </p:extLst>
+          </p:nvPr>
+        </p:nvGraphicFramePr>
+        <p:xfrm>
+          <a:off x="1096963" y="2193735"/>
+          <a:ext cx="9729533" cy="457200"/>
+        </p:xfrm>
+        <a:graphic>
+          <a:graphicData uri="http://schemas.openxmlformats.org/drawingml/2006/table">
+            <a:tbl>
+              <a:tblPr firstRow="1" bandRow="1">
+                <a:tableStyleId>{5C22544A-7EE6-4342-B048-85BDC9FD1C3A}</a:tableStyleId>
+              </a:tblPr>
+              <a:tblGrid>
+                <a:gridCol w="884503"/>
+                <a:gridCol w="884503"/>
+                <a:gridCol w="1024106"/>
+                <a:gridCol w="914400"/>
+                <a:gridCol w="852406"/>
+                <a:gridCol w="747100"/>
+                <a:gridCol w="884503"/>
+                <a:gridCol w="884503"/>
+                <a:gridCol w="884503"/>
+                <a:gridCol w="884503"/>
+                <a:gridCol w="884503"/>
+              </a:tblGrid>
+              <a:tr h="284289">
+                <a:tc>
+                  <a:txBody>
+                    <a:bodyPr/>
+                    <a:lstStyle/>
+                    <a:p>
+                      <a:r>
+                        <a:rPr lang="en-US" sz="1200" dirty="0" err="1" smtClean="0"/>
+                        <a:t>EventID</a:t>
+                      </a:r>
+                      <a:endParaRPr lang="en-US" sz="1200" dirty="0"/>
+                    </a:p>
+                  </a:txBody>
+                  <a:tcPr/>
+                </a:tc>
+                <a:tc>
+                  <a:txBody>
+                    <a:bodyPr/>
+                    <a:lstStyle/>
+                    <a:p>
+                      <a:r>
+                        <a:rPr lang="en-US" sz="1200" dirty="0" err="1" smtClean="0"/>
+                        <a:t>EventType</a:t>
+                      </a:r>
+                      <a:endParaRPr lang="en-US" sz="1200" dirty="0"/>
+                    </a:p>
+                  </a:txBody>
+                  <a:tcPr/>
+                </a:tc>
+                <a:tc>
+                  <a:txBody>
+                    <a:bodyPr/>
+                    <a:lstStyle/>
+                    <a:p>
+                      <a:r>
+                        <a:rPr lang="en-US" sz="1200" dirty="0" err="1" smtClean="0"/>
+                        <a:t>EventName</a:t>
+                      </a:r>
+                      <a:endParaRPr lang="en-US" sz="1200" dirty="0"/>
+                    </a:p>
+                  </a:txBody>
+                  <a:tcPr/>
+                </a:tc>
+                <a:tc>
+                  <a:txBody>
+                    <a:bodyPr/>
+                    <a:lstStyle/>
+                    <a:p>
+                      <a:r>
+                        <a:rPr lang="en-US" sz="1200" dirty="0" err="1" smtClean="0"/>
+                        <a:t>EventDate</a:t>
+                      </a:r>
+                      <a:endParaRPr lang="en-US" sz="1200" dirty="0"/>
+                    </a:p>
+                  </a:txBody>
+                  <a:tcPr/>
+                </a:tc>
+                <a:tc>
+                  <a:txBody>
+                    <a:bodyPr/>
+                    <a:lstStyle/>
+                    <a:p>
+                      <a:r>
+                        <a:rPr lang="en-US" sz="1200" dirty="0" err="1" smtClean="0"/>
+                        <a:t>EventTime</a:t>
+                      </a:r>
+                      <a:endParaRPr lang="en-US" sz="1200" dirty="0"/>
+                    </a:p>
+                  </a:txBody>
+                  <a:tcPr/>
+                </a:tc>
+                <a:tc>
+                  <a:txBody>
+                    <a:bodyPr/>
+                    <a:lstStyle/>
+                    <a:p>
+                      <a:r>
+                        <a:rPr lang="en-US" sz="1200" dirty="0" smtClean="0"/>
+                        <a:t>Duration</a:t>
+                      </a:r>
+                      <a:endParaRPr lang="en-US" sz="1200" dirty="0"/>
+                    </a:p>
+                  </a:txBody>
+                  <a:tcPr/>
+                </a:tc>
+                <a:tc>
+                  <a:txBody>
+                    <a:bodyPr/>
+                    <a:lstStyle/>
+                    <a:p>
+                      <a:r>
+                        <a:rPr lang="en-US" sz="1200" dirty="0" err="1" smtClean="0"/>
+                        <a:t>VenueID</a:t>
+                      </a:r>
+                      <a:endParaRPr lang="en-US" sz="1200" dirty="0"/>
+                    </a:p>
+                  </a:txBody>
+                  <a:tcPr/>
+                </a:tc>
+                <a:tc>
+                  <a:txBody>
+                    <a:bodyPr/>
+                    <a:lstStyle/>
+                    <a:p>
+                      <a:r>
+                        <a:rPr lang="en-US" sz="1200" dirty="0" err="1" smtClean="0"/>
+                        <a:t>PerformerName</a:t>
+                      </a:r>
+                      <a:endParaRPr lang="en-US" sz="1200" dirty="0"/>
+                    </a:p>
+                  </a:txBody>
+                  <a:tcPr/>
+                </a:tc>
+                <a:tc>
+                  <a:txBody>
+                    <a:bodyPr/>
+                    <a:lstStyle/>
+                    <a:p>
+                      <a:r>
+                        <a:rPr lang="en-US" sz="1200" dirty="0" err="1" smtClean="0"/>
+                        <a:t>AgeReq</a:t>
+                      </a:r>
+                      <a:endParaRPr lang="en-US" sz="1200" dirty="0"/>
+                    </a:p>
+                  </a:txBody>
+                  <a:tcPr/>
+                </a:tc>
+                <a:tc>
+                  <a:txBody>
+                    <a:bodyPr/>
+                    <a:lstStyle/>
+                    <a:p>
+                      <a:r>
+                        <a:rPr lang="en-US" sz="1200" dirty="0" smtClean="0"/>
+                        <a:t>Category</a:t>
+                      </a:r>
+                      <a:endParaRPr lang="en-US" sz="1200" dirty="0"/>
+                    </a:p>
+                  </a:txBody>
+                  <a:tcPr/>
+                </a:tc>
+                <a:tc>
+                  <a:txBody>
+                    <a:bodyPr/>
+                    <a:lstStyle/>
+                    <a:p>
+                      <a:r>
+                        <a:rPr lang="en-US" sz="1200" dirty="0" err="1" smtClean="0"/>
+                        <a:t>PresaleDate</a:t>
+                      </a:r>
+                      <a:endParaRPr lang="en-US" sz="1200" dirty="0"/>
+                    </a:p>
+                  </a:txBody>
+                  <a:tcPr/>
+                </a:tc>
+              </a:tr>
+            </a:tbl>
+          </a:graphicData>
+        </a:graphic>
+      </p:graphicFrame>
+      <p:sp>
+        <p:nvSpPr>
+          <p:cNvPr id="8" name="TextBox 7"/>
+          <p:cNvSpPr txBox="1"/>
           <p:nvPr/>
-        </p:nvPicPr>
-        <p:blipFill>
-          <a:blip r:embed="rId2"/>
-          <a:stretch>
-            <a:fillRect/>
-          </a:stretch>
-        </p:blipFill>
+        </p:nvSpPr>
         <p:spPr>
           <a:xfrm>
-            <a:off x="0" y="-13671"/>
-            <a:ext cx="12192000" cy="6871671"/>
-          </a:xfrm>
-          <a:prstGeom prst="rect">
-            <a:avLst/>
-          </a:prstGeom>
-        </p:spPr>
-      </p:pic>
-      <p:sp>
-        <p:nvSpPr>
-          <p:cNvPr id="11" name="TextBox 10">
-            <a:extLst>
-              <a:ext uri="{FF2B5EF4-FFF2-40B4-BE49-F238E27FC236}">
-                <a16:creationId xmlns:a16="http://schemas.microsoft.com/office/drawing/2014/main" xmlns="" id="{A852D194-0C06-4155-BBF8-6C051F5C22F5}"/>
-              </a:ext>
-            </a:extLst>
-          </p:cNvPr>
-          <p:cNvSpPr txBox="1"/>
-          <p:nvPr/>
-        </p:nvSpPr>
-        <p:spPr>
-          <a:xfrm>
-            <a:off x="10819771" y="5869094"/>
-            <a:ext cx="549897" cy="400110"/>
+            <a:off x="1096963" y="4523514"/>
+            <a:ext cx="4242816" cy="369332"/>
           </a:xfrm>
           <a:prstGeom prst="rect">
             <a:avLst/>
@@ -4920,16 +5291,293 @@
           <a:lstStyle/>
           <a:p>
             <a:r>
-              <a:rPr lang="en-US" sz="2000" dirty="0"/>
-              <a:t>[1]</a:t>
-            </a:r>
+              <a:rPr lang="en-US" b="1" dirty="0" smtClean="0"/>
+              <a:t>Member</a:t>
+            </a:r>
+            <a:endParaRPr lang="en-US" b="1" dirty="0"/>
+          </a:p>
+        </p:txBody>
+      </p:sp>
+      <p:sp>
+        <p:nvSpPr>
+          <p:cNvPr id="9" name="TextBox 8"/>
+          <p:cNvSpPr txBox="1"/>
+          <p:nvPr/>
+        </p:nvSpPr>
+        <p:spPr>
+          <a:xfrm>
+            <a:off x="1096963" y="1780881"/>
+            <a:ext cx="2386901" cy="369332"/>
+          </a:xfrm>
+          <a:prstGeom prst="rect">
+            <a:avLst/>
+          </a:prstGeom>
+          <a:noFill/>
+        </p:spPr>
+        <p:txBody>
+          <a:bodyPr wrap="square" rtlCol="0">
+            <a:spAutoFit/>
+          </a:bodyPr>
+          <a:lstStyle/>
+          <a:p>
+            <a:r>
+              <a:rPr lang="en-US" b="1" dirty="0" smtClean="0"/>
+              <a:t>Event</a:t>
+            </a:r>
+            <a:endParaRPr lang="en-US" b="1" dirty="0"/>
+          </a:p>
+        </p:txBody>
+      </p:sp>
+      <p:graphicFrame>
+        <p:nvGraphicFramePr>
+          <p:cNvPr id="10" name="Table 9"/>
+          <p:cNvGraphicFramePr>
+            <a:graphicFrameLocks noGrp="1"/>
+          </p:cNvGraphicFramePr>
+          <p:nvPr>
+            <p:extLst>
+              <p:ext uri="{D42A27DB-BD31-4B8C-83A1-F6EECF244321}">
+                <p14:modId xmlns:p14="http://schemas.microsoft.com/office/powerpoint/2010/main" val="92633319"/>
+              </p:ext>
+            </p:extLst>
+          </p:nvPr>
+        </p:nvGraphicFramePr>
+        <p:xfrm>
+          <a:off x="1096965" y="3946618"/>
+          <a:ext cx="9729530" cy="457200"/>
+        </p:xfrm>
+        <a:graphic>
+          <a:graphicData uri="http://schemas.openxmlformats.org/drawingml/2006/table">
+            <a:tbl>
+              <a:tblPr firstRow="1" bandRow="1">
+                <a:tableStyleId>{5C22544A-7EE6-4342-B048-85BDC9FD1C3A}</a:tableStyleId>
+              </a:tblPr>
+              <a:tblGrid>
+                <a:gridCol w="972953"/>
+                <a:gridCol w="972953"/>
+                <a:gridCol w="972953"/>
+                <a:gridCol w="972953"/>
+                <a:gridCol w="972953"/>
+                <a:gridCol w="563056"/>
+                <a:gridCol w="526943"/>
+                <a:gridCol w="1022888"/>
+                <a:gridCol w="1317356"/>
+                <a:gridCol w="1434522"/>
+              </a:tblGrid>
+              <a:tr h="370840">
+                <a:tc>
+                  <a:txBody>
+                    <a:bodyPr/>
+                    <a:lstStyle/>
+                    <a:p>
+                      <a:r>
+                        <a:rPr lang="en-US" sz="1200" dirty="0" err="1" smtClean="0"/>
+                        <a:t>TicketNumber</a:t>
+                      </a:r>
+                      <a:endParaRPr lang="en-US" sz="1200" dirty="0"/>
+                    </a:p>
+                  </a:txBody>
+                  <a:tcPr/>
+                </a:tc>
+                <a:tc>
+                  <a:txBody>
+                    <a:bodyPr/>
+                    <a:lstStyle/>
+                    <a:p>
+                      <a:r>
+                        <a:rPr lang="en-US" sz="1200" dirty="0" err="1" smtClean="0"/>
+                        <a:t>EventID</a:t>
+                      </a:r>
+                      <a:endParaRPr lang="en-US" sz="1200" dirty="0"/>
+                    </a:p>
+                  </a:txBody>
+                  <a:tcPr/>
+                </a:tc>
+                <a:tc>
+                  <a:txBody>
+                    <a:bodyPr/>
+                    <a:lstStyle/>
+                    <a:p>
+                      <a:r>
+                        <a:rPr lang="en-US" sz="1200" dirty="0" err="1" smtClean="0"/>
+                        <a:t>VenueID</a:t>
+                      </a:r>
+                      <a:endParaRPr lang="en-US" sz="1200" dirty="0" smtClean="0"/>
+                    </a:p>
+                  </a:txBody>
+                  <a:tcPr/>
+                </a:tc>
+                <a:tc>
+                  <a:txBody>
+                    <a:bodyPr/>
+                    <a:lstStyle/>
+                    <a:p>
+                      <a:r>
+                        <a:rPr lang="en-US" sz="1200" dirty="0" err="1" smtClean="0"/>
+                        <a:t>MemberID</a:t>
+                      </a:r>
+                      <a:endParaRPr lang="en-US" sz="1200" dirty="0"/>
+                    </a:p>
+                  </a:txBody>
+                  <a:tcPr/>
+                </a:tc>
+                <a:tc>
+                  <a:txBody>
+                    <a:bodyPr/>
+                    <a:lstStyle/>
+                    <a:p>
+                      <a:r>
+                        <a:rPr lang="en-US" sz="1200" dirty="0" smtClean="0"/>
+                        <a:t>Section</a:t>
+                      </a:r>
+                      <a:endParaRPr lang="en-US" sz="1200" dirty="0"/>
+                    </a:p>
+                  </a:txBody>
+                  <a:tcPr/>
+                </a:tc>
+                <a:tc>
+                  <a:txBody>
+                    <a:bodyPr/>
+                    <a:lstStyle/>
+                    <a:p>
+                      <a:r>
+                        <a:rPr lang="en-US" sz="1200" dirty="0" smtClean="0"/>
+                        <a:t>Row</a:t>
+                      </a:r>
+                      <a:endParaRPr lang="en-US" sz="1200" dirty="0"/>
+                    </a:p>
+                  </a:txBody>
+                  <a:tcPr/>
+                </a:tc>
+                <a:tc>
+                  <a:txBody>
+                    <a:bodyPr/>
+                    <a:lstStyle/>
+                    <a:p>
+                      <a:r>
+                        <a:rPr lang="en-US" sz="1200" dirty="0" smtClean="0"/>
+                        <a:t>Seat</a:t>
+                      </a:r>
+                      <a:endParaRPr lang="en-US" sz="1200" dirty="0"/>
+                    </a:p>
+                  </a:txBody>
+                  <a:tcPr/>
+                </a:tc>
+                <a:tc>
+                  <a:txBody>
+                    <a:bodyPr/>
+                    <a:lstStyle/>
+                    <a:p>
+                      <a:r>
+                        <a:rPr lang="en-US" sz="1200" dirty="0" err="1" smtClean="0"/>
+                        <a:t>TicketPrice</a:t>
+                      </a:r>
+                      <a:endParaRPr lang="en-US" sz="1200" dirty="0"/>
+                    </a:p>
+                  </a:txBody>
+                  <a:tcPr/>
+                </a:tc>
+                <a:tc>
+                  <a:txBody>
+                    <a:bodyPr/>
+                    <a:lstStyle/>
+                    <a:p>
+                      <a:r>
+                        <a:rPr lang="en-US" sz="1200" dirty="0" err="1" smtClean="0"/>
+                        <a:t>TicketClassName</a:t>
+                      </a:r>
+                      <a:endParaRPr lang="en-US" sz="1200" dirty="0"/>
+                    </a:p>
+                  </a:txBody>
+                  <a:tcPr/>
+                </a:tc>
+                <a:tc>
+                  <a:txBody>
+                    <a:bodyPr/>
+                    <a:lstStyle/>
+                    <a:p>
+                      <a:r>
+                        <a:rPr lang="en-US" sz="1200" dirty="0" smtClean="0"/>
+                        <a:t>Add-</a:t>
+                      </a:r>
+                      <a:r>
+                        <a:rPr lang="en-US" sz="1200" dirty="0" err="1" smtClean="0"/>
+                        <a:t>onCode</a:t>
+                      </a:r>
+                      <a:endParaRPr lang="en-US" sz="1200" dirty="0"/>
+                    </a:p>
+                  </a:txBody>
+                  <a:tcPr/>
+                </a:tc>
+              </a:tr>
+            </a:tbl>
+          </a:graphicData>
+        </a:graphic>
+      </p:graphicFrame>
+      <p:sp>
+        <p:nvSpPr>
+          <p:cNvPr id="13" name="TextBox 12"/>
+          <p:cNvSpPr txBox="1"/>
+          <p:nvPr/>
+        </p:nvSpPr>
+        <p:spPr>
+          <a:xfrm>
+            <a:off x="1096963" y="3577286"/>
+            <a:ext cx="4242816" cy="369332"/>
+          </a:xfrm>
+          <a:prstGeom prst="rect">
+            <a:avLst/>
+          </a:prstGeom>
+          <a:noFill/>
+        </p:spPr>
+        <p:txBody>
+          <a:bodyPr wrap="square" rtlCol="0">
+            <a:spAutoFit/>
+          </a:bodyPr>
+          <a:lstStyle/>
+          <a:p>
+            <a:r>
+              <a:rPr lang="en-US" b="1" dirty="0" smtClean="0"/>
+              <a:t>Ticket</a:t>
+            </a:r>
+            <a:endParaRPr lang="en-US" b="1" dirty="0"/>
+          </a:p>
+        </p:txBody>
+      </p:sp>
+      <p:sp>
+        <p:nvSpPr>
+          <p:cNvPr id="14" name="TextBox 13"/>
+          <p:cNvSpPr txBox="1"/>
+          <p:nvPr/>
+        </p:nvSpPr>
+        <p:spPr>
+          <a:xfrm>
+            <a:off x="1096963" y="2770631"/>
+            <a:ext cx="4242816" cy="369332"/>
+          </a:xfrm>
+          <a:prstGeom prst="rect">
+            <a:avLst/>
+          </a:prstGeom>
+          <a:noFill/>
+        </p:spPr>
+        <p:txBody>
+          <a:bodyPr wrap="square" rtlCol="0">
+            <a:spAutoFit/>
+          </a:bodyPr>
+          <a:lstStyle/>
+          <a:p>
+            <a:r>
+              <a:rPr lang="en-US" b="1" dirty="0" smtClean="0"/>
+              <a:t>Venue</a:t>
+            </a:r>
+            <a:endParaRPr lang="en-US" b="1" dirty="0"/>
           </a:p>
         </p:txBody>
       </p:sp>
     </p:spTree>
     <p:extLst>
       <p:ext uri="{BB962C8B-B14F-4D97-AF65-F5344CB8AC3E}">
-        <p14:creationId xmlns:p14="http://schemas.microsoft.com/office/powerpoint/2010/main" val="959148159"/>
+        <p14:creationId xmlns:p14="http://schemas.microsoft.com/office/powerpoint/2010/main" val="2364865490"/>
       </p:ext>
     </p:extLst>
   </p:cSld>
@@ -4971,7 +5619,7 @@
           <p:cNvPr id="2" name="Title 1">
             <a:extLst>
               <a:ext uri="{FF2B5EF4-FFF2-40B4-BE49-F238E27FC236}">
-                <a16:creationId xmlns:a16="http://schemas.microsoft.com/office/drawing/2014/main" xmlns="" id="{8783FB70-CFB1-4049-90A7-8A85A4FA70EB}"/>
+                <a16:creationId xmlns="" xmlns:a16="http://schemas.microsoft.com/office/drawing/2014/main" id="{B710DC17-3948-4282-A1B7-A9D1AEB4E485}"/>
               </a:ext>
             </a:extLst>
           </p:cNvPr>
@@ -4987,7 +5635,12 @@
           <a:bodyPr/>
           <a:lstStyle/>
           <a:p>
-            <a:endParaRPr lang="en-US"/>
+            <a:pPr algn="ctr"/>
+            <a:r>
+              <a:rPr lang="en-US" sz="6000" dirty="0"/>
+              <a:t>Problems and Solutions</a:t>
+            </a:r>
+            <a:endParaRPr lang="en-US" dirty="0"/>
           </a:p>
         </p:txBody>
       </p:sp>
@@ -4996,7 +5649,7 @@
           <p:cNvPr id="3" name="Content Placeholder 2">
             <a:extLst>
               <a:ext uri="{FF2B5EF4-FFF2-40B4-BE49-F238E27FC236}">
-                <a16:creationId xmlns:a16="http://schemas.microsoft.com/office/drawing/2014/main" xmlns="" id="{6A515C07-4F6E-46BD-B8B2-E03B7463CB18}"/>
+                <a16:creationId xmlns="" xmlns:a16="http://schemas.microsoft.com/office/drawing/2014/main" id="{76285C5E-7BC1-47DE-941B-2C622FFEB19B}"/>
               </a:ext>
             </a:extLst>
           </p:cNvPr>
@@ -5009,82 +5662,94 @@
         </p:nvSpPr>
         <p:spPr/>
         <p:txBody>
-          <a:bodyPr/>
-          <a:lstStyle/>
-          <a:p>
-            <a:endParaRPr lang="en-US" dirty="0"/>
-          </a:p>
-        </p:txBody>
-      </p:sp>
-      <p:pic>
-        <p:nvPicPr>
-          <p:cNvPr id="9" name="Picture 8">
-            <a:extLst>
-              <a:ext uri="{FF2B5EF4-FFF2-40B4-BE49-F238E27FC236}">
-                <a16:creationId xmlns:a16="http://schemas.microsoft.com/office/drawing/2014/main" xmlns="" id="{47E0FD5E-DEFC-462D-BBCF-34E6F624FFF2}"/>
-              </a:ext>
-            </a:extLst>
-          </p:cNvPr>
-          <p:cNvPicPr>
-            <a:picLocks noChangeAspect="1"/>
-          </p:cNvPicPr>
-          <p:nvPr/>
-        </p:nvPicPr>
-        <p:blipFill>
-          <a:blip r:embed="rId2"/>
-          <a:stretch>
-            <a:fillRect/>
-          </a:stretch>
-        </p:blipFill>
-        <p:spPr>
-          <a:xfrm>
-            <a:off x="-10159" y="-5096"/>
-            <a:ext cx="12191998" cy="6868192"/>
-          </a:xfrm>
-          <a:prstGeom prst="rect">
-            <a:avLst/>
-          </a:prstGeom>
-        </p:spPr>
-      </p:pic>
-      <p:sp>
-        <p:nvSpPr>
-          <p:cNvPr id="10" name="TextBox 9">
-            <a:extLst>
-              <a:ext uri="{FF2B5EF4-FFF2-40B4-BE49-F238E27FC236}">
-                <a16:creationId xmlns:a16="http://schemas.microsoft.com/office/drawing/2014/main" xmlns="" id="{213C964C-3F44-4B49-8B8E-F9D5469FA7E9}"/>
-              </a:ext>
-            </a:extLst>
-          </p:cNvPr>
-          <p:cNvSpPr txBox="1"/>
-          <p:nvPr/>
-        </p:nvSpPr>
-        <p:spPr>
-          <a:xfrm>
-            <a:off x="10962535" y="5902962"/>
-            <a:ext cx="549897" cy="400110"/>
-          </a:xfrm>
-          <a:prstGeom prst="rect">
-            <a:avLst/>
-          </a:prstGeom>
-          <a:noFill/>
-        </p:spPr>
-        <p:txBody>
-          <a:bodyPr wrap="square" rtlCol="0">
-            <a:spAutoFit/>
+          <a:bodyPr>
+            <a:normAutofit fontScale="92500"/>
           </a:bodyPr>
           <a:lstStyle/>
           <a:p>
-            <a:r>
-              <a:rPr lang="en-US" sz="2000" dirty="0"/>
-              <a:t>[1]</a:t>
-            </a:r>
+            <a:pPr lvl="1"/>
+            <a:r>
+              <a:rPr lang="en-US" sz="2800" dirty="0" smtClean="0"/>
+              <a:t>Data generation</a:t>
+            </a:r>
+            <a:endParaRPr lang="en-US" sz="2800" dirty="0"/>
+          </a:p>
+          <a:p>
+            <a:pPr lvl="2"/>
+            <a:r>
+              <a:rPr lang="en-US" sz="2400" dirty="0" smtClean="0"/>
+              <a:t>Thought we could automate, but were unable </a:t>
+            </a:r>
+            <a:r>
+              <a:rPr lang="en-US" sz="2400" dirty="0" smtClean="0"/>
+              <a:t>to</a:t>
+            </a:r>
+            <a:endParaRPr lang="en-US" sz="2400" dirty="0"/>
+          </a:p>
+          <a:p>
+            <a:pPr lvl="4"/>
+            <a:r>
+              <a:rPr lang="en-US" sz="2400" dirty="0" smtClean="0"/>
+              <a:t>Ended up writing out all data and insert statements by hand</a:t>
+            </a:r>
+          </a:p>
+          <a:p>
+            <a:pPr lvl="1"/>
+            <a:r>
+              <a:rPr lang="en-US" sz="2800" dirty="0" smtClean="0"/>
+              <a:t>Queries</a:t>
+            </a:r>
+          </a:p>
+          <a:p>
+            <a:pPr lvl="2"/>
+            <a:r>
+              <a:rPr lang="en-US" sz="2400" dirty="0" smtClean="0"/>
+              <a:t>Kept generating spurious tuples</a:t>
+            </a:r>
+          </a:p>
+          <a:p>
+            <a:pPr lvl="4"/>
+            <a:r>
+              <a:rPr lang="en-US" sz="2400" dirty="0" smtClean="0"/>
+              <a:t>Took several attempts to arrive at queries that generated the response we were looking for</a:t>
+            </a:r>
+            <a:endParaRPr lang="en-US" sz="2400" dirty="0" smtClean="0"/>
+          </a:p>
+          <a:p>
+            <a:pPr lvl="1"/>
+            <a:r>
+              <a:rPr lang="en-US" sz="2800" dirty="0" smtClean="0"/>
+              <a:t>Insertions</a:t>
+            </a:r>
+          </a:p>
+          <a:p>
+            <a:pPr lvl="2"/>
+            <a:r>
+              <a:rPr lang="en-US" sz="2400" dirty="0" smtClean="0"/>
+              <a:t>Getting errors</a:t>
+            </a:r>
+          </a:p>
+          <a:p>
+            <a:pPr lvl="4"/>
+            <a:r>
+              <a:rPr lang="en-US" sz="2400" dirty="0" smtClean="0"/>
+              <a:t>Had to go through all hand written insertions and eventually found the errors</a:t>
+            </a:r>
+            <a:endParaRPr lang="en-US" sz="2400" dirty="0"/>
+          </a:p>
+          <a:p>
+            <a:pPr lvl="2"/>
+            <a:endParaRPr lang="en-US" sz="2400" dirty="0"/>
+          </a:p>
+          <a:p>
+            <a:endParaRPr lang="en-US" dirty="0" smtClean="0"/>
           </a:p>
         </p:txBody>
       </p:sp>
     </p:spTree>
     <p:extLst>
       <p:ext uri="{BB962C8B-B14F-4D97-AF65-F5344CB8AC3E}">
-        <p14:creationId xmlns:p14="http://schemas.microsoft.com/office/powerpoint/2010/main" val="3419845302"/>
+        <p14:creationId xmlns:p14="http://schemas.microsoft.com/office/powerpoint/2010/main" val="1271762142"/>
       </p:ext>
     </p:extLst>
   </p:cSld>
@@ -5126,7 +5791,7 @@
           <p:cNvPr id="2" name="Title 1">
             <a:extLst>
               <a:ext uri="{FF2B5EF4-FFF2-40B4-BE49-F238E27FC236}">
-                <a16:creationId xmlns:a16="http://schemas.microsoft.com/office/drawing/2014/main" xmlns="" id="{0BBA2ADD-E567-4915-A1D4-A88C406B3AF5}"/>
+                <a16:creationId xmlns="" xmlns:a16="http://schemas.microsoft.com/office/drawing/2014/main" id="{0BBA2ADD-E567-4915-A1D4-A88C406B3AF5}"/>
               </a:ext>
             </a:extLst>
           </p:cNvPr>
@@ -5157,7 +5822,7 @@
           <p:cNvPr id="3" name="Content Placeholder 2">
             <a:extLst>
               <a:ext uri="{FF2B5EF4-FFF2-40B4-BE49-F238E27FC236}">
-                <a16:creationId xmlns:a16="http://schemas.microsoft.com/office/drawing/2014/main" xmlns="" id="{3C46E528-A362-47E8-8849-4B4EC8BC9E3D}"/>
+                <a16:creationId xmlns="" xmlns:a16="http://schemas.microsoft.com/office/drawing/2014/main" id="{3C46E528-A362-47E8-8849-4B4EC8BC9E3D}"/>
               </a:ext>
             </a:extLst>
           </p:cNvPr>

</xml_diff>